<commit_message>
Completed the characterization study chapter
</commit_message>
<xml_diff>
--- a/NewThesis/LaTex-template-package/Drawing4/SystemOverview.pptx
+++ b/NewThesis/LaTex-template-package/Drawing4/SystemOverview.pptx
@@ -243,7 +243,7 @@
           <a:p>
             <a:fld id="{9515DF3E-F12B-478A-A372-8B0BE7EFCB50}" type="datetimeFigureOut">
               <a:rPr lang="en-CA" smtClean="0"/>
-              <a:t>2016-08-14</a:t>
+              <a:t>18/10/2016</a:t>
             </a:fld>
             <a:endParaRPr lang="en-CA"/>
           </a:p>
@@ -413,7 +413,7 @@
           <a:p>
             <a:fld id="{9515DF3E-F12B-478A-A372-8B0BE7EFCB50}" type="datetimeFigureOut">
               <a:rPr lang="en-CA" smtClean="0"/>
-              <a:t>2016-08-14</a:t>
+              <a:t>18/10/2016</a:t>
             </a:fld>
             <a:endParaRPr lang="en-CA"/>
           </a:p>
@@ -593,7 +593,7 @@
           <a:p>
             <a:fld id="{9515DF3E-F12B-478A-A372-8B0BE7EFCB50}" type="datetimeFigureOut">
               <a:rPr lang="en-CA" smtClean="0"/>
-              <a:t>2016-08-14</a:t>
+              <a:t>18/10/2016</a:t>
             </a:fld>
             <a:endParaRPr lang="en-CA"/>
           </a:p>
@@ -763,7 +763,7 @@
           <a:p>
             <a:fld id="{9515DF3E-F12B-478A-A372-8B0BE7EFCB50}" type="datetimeFigureOut">
               <a:rPr lang="en-CA" smtClean="0"/>
-              <a:t>2016-08-14</a:t>
+              <a:t>18/10/2016</a:t>
             </a:fld>
             <a:endParaRPr lang="en-CA"/>
           </a:p>
@@ -1007,7 +1007,7 @@
           <a:p>
             <a:fld id="{9515DF3E-F12B-478A-A372-8B0BE7EFCB50}" type="datetimeFigureOut">
               <a:rPr lang="en-CA" smtClean="0"/>
-              <a:t>2016-08-14</a:t>
+              <a:t>18/10/2016</a:t>
             </a:fld>
             <a:endParaRPr lang="en-CA"/>
           </a:p>
@@ -1239,7 +1239,7 @@
           <a:p>
             <a:fld id="{9515DF3E-F12B-478A-A372-8B0BE7EFCB50}" type="datetimeFigureOut">
               <a:rPr lang="en-CA" smtClean="0"/>
-              <a:t>2016-08-14</a:t>
+              <a:t>18/10/2016</a:t>
             </a:fld>
             <a:endParaRPr lang="en-CA"/>
           </a:p>
@@ -1606,7 +1606,7 @@
           <a:p>
             <a:fld id="{9515DF3E-F12B-478A-A372-8B0BE7EFCB50}" type="datetimeFigureOut">
               <a:rPr lang="en-CA" smtClean="0"/>
-              <a:t>2016-08-14</a:t>
+              <a:t>18/10/2016</a:t>
             </a:fld>
             <a:endParaRPr lang="en-CA"/>
           </a:p>
@@ -1724,7 +1724,7 @@
           <a:p>
             <a:fld id="{9515DF3E-F12B-478A-A372-8B0BE7EFCB50}" type="datetimeFigureOut">
               <a:rPr lang="en-CA" smtClean="0"/>
-              <a:t>2016-08-14</a:t>
+              <a:t>18/10/2016</a:t>
             </a:fld>
             <a:endParaRPr lang="en-CA"/>
           </a:p>
@@ -1819,7 +1819,7 @@
           <a:p>
             <a:fld id="{9515DF3E-F12B-478A-A372-8B0BE7EFCB50}" type="datetimeFigureOut">
               <a:rPr lang="en-CA" smtClean="0"/>
-              <a:t>2016-08-14</a:t>
+              <a:t>18/10/2016</a:t>
             </a:fld>
             <a:endParaRPr lang="en-CA"/>
           </a:p>
@@ -2096,7 +2096,7 @@
           <a:p>
             <a:fld id="{9515DF3E-F12B-478A-A372-8B0BE7EFCB50}" type="datetimeFigureOut">
               <a:rPr lang="en-CA" smtClean="0"/>
-              <a:t>2016-08-14</a:t>
+              <a:t>18/10/2016</a:t>
             </a:fld>
             <a:endParaRPr lang="en-CA"/>
           </a:p>
@@ -2353,7 +2353,7 @@
           <a:p>
             <a:fld id="{9515DF3E-F12B-478A-A372-8B0BE7EFCB50}" type="datetimeFigureOut">
               <a:rPr lang="en-CA" smtClean="0"/>
-              <a:t>2016-08-14</a:t>
+              <a:t>18/10/2016</a:t>
             </a:fld>
             <a:endParaRPr lang="en-CA"/>
           </a:p>
@@ -2566,7 +2566,7 @@
           <a:p>
             <a:fld id="{9515DF3E-F12B-478A-A372-8B0BE7EFCB50}" type="datetimeFigureOut">
               <a:rPr lang="en-CA" smtClean="0"/>
-              <a:t>2016-08-14</a:t>
+              <a:t>18/10/2016</a:t>
             </a:fld>
             <a:endParaRPr lang="en-CA"/>
           </a:p>
@@ -2979,7 +2979,7 @@
         </p:nvSpPr>
         <p:spPr>
           <a:xfrm>
-            <a:off x="589293" y="5655501"/>
+            <a:off x="589293" y="5625090"/>
             <a:ext cx="7043098" cy="1137454"/>
           </a:xfrm>
           <a:prstGeom prst="rect">
@@ -3073,7 +3073,7 @@
         </p:nvSpPr>
         <p:spPr>
           <a:xfrm>
-            <a:off x="620383" y="384201"/>
+            <a:off x="620383" y="407061"/>
             <a:ext cx="7019548" cy="2383477"/>
           </a:xfrm>
           <a:prstGeom prst="rect">
@@ -3120,7 +3120,7 @@
         </p:nvSpPr>
         <p:spPr>
           <a:xfrm>
-            <a:off x="961303" y="497376"/>
+            <a:off x="950206" y="634340"/>
             <a:ext cx="807940" cy="903615"/>
           </a:xfrm>
           <a:prstGeom prst="flowChartMagneticDisk">
@@ -3190,7 +3190,7 @@
         </p:nvSpPr>
         <p:spPr>
           <a:xfrm>
-            <a:off x="2063994" y="688694"/>
+            <a:off x="2063992" y="868407"/>
             <a:ext cx="195605" cy="408221"/>
           </a:xfrm>
           <a:prstGeom prst="rightArrow">
@@ -3259,7 +3259,7 @@
         </p:nvSpPr>
         <p:spPr>
           <a:xfrm>
-            <a:off x="2578374" y="573334"/>
+            <a:off x="2578374" y="745079"/>
             <a:ext cx="2025616" cy="654875"/>
           </a:xfrm>
           <a:prstGeom prst="roundRect">
@@ -3329,7 +3329,7 @@
         </p:nvSpPr>
         <p:spPr>
           <a:xfrm>
-            <a:off x="5488366" y="631150"/>
+            <a:off x="5516954" y="802820"/>
             <a:ext cx="1267187" cy="501772"/>
           </a:xfrm>
           <a:prstGeom prst="flowChartMultidocument">
@@ -3446,7 +3446,7 @@
         </p:nvSpPr>
         <p:spPr>
           <a:xfrm>
-            <a:off x="4922767" y="677927"/>
+            <a:off x="4983681" y="868405"/>
             <a:ext cx="195605" cy="408221"/>
           </a:xfrm>
           <a:prstGeom prst="rightArrow">
@@ -3585,7 +3585,7 @@
         </p:nvSpPr>
         <p:spPr>
           <a:xfrm rot="5400000">
-            <a:off x="5999714" y="1316570"/>
+            <a:off x="6091811" y="1410681"/>
             <a:ext cx="195605" cy="408221"/>
           </a:xfrm>
           <a:prstGeom prst="rightArrow">
@@ -3654,7 +3654,7 @@
         </p:nvSpPr>
         <p:spPr>
           <a:xfrm rot="10800000">
-            <a:off x="4791696" y="4720077"/>
+            <a:off x="4783065" y="4720077"/>
             <a:ext cx="200616" cy="408221"/>
           </a:xfrm>
           <a:prstGeom prst="rightArrow">
@@ -3780,21 +3780,8 @@
                   <a:srgbClr val="666633"/>
                 </a:solidFill>
               </a:rPr>
-              <a:t> </a:t>
-            </a:r>
-            <a:r>
-              <a:rPr lang="en-CA" sz="1406" dirty="0" smtClean="0">
-                <a:solidFill>
-                  <a:srgbClr val="666633"/>
-                </a:solidFill>
-              </a:rPr>
-              <a:t>Anti-unified AUASTs</a:t>
-            </a:r>
-            <a:endParaRPr lang="en-CA" sz="1406" dirty="0">
-              <a:solidFill>
-                <a:srgbClr val="666633"/>
-              </a:solidFill>
-            </a:endParaRPr>
+              <a:t> Anti-unified AUASTs</a:t>
+            </a:r>
           </a:p>
         </p:txBody>
       </p:sp>
@@ -3876,7 +3863,7 @@
         </p:nvSpPr>
         <p:spPr>
           <a:xfrm>
-            <a:off x="5459868" y="4618783"/>
+            <a:off x="5417168" y="4560349"/>
             <a:ext cx="1611671" cy="587544"/>
           </a:xfrm>
           <a:prstGeom prst="roundRect">
@@ -3946,7 +3933,7 @@
         </p:nvSpPr>
         <p:spPr>
           <a:xfrm>
-            <a:off x="2797409" y="4673302"/>
+            <a:off x="2797409" y="4626527"/>
             <a:ext cx="1267187" cy="501772"/>
           </a:xfrm>
           <a:prstGeom prst="flowChartMultidocument">
@@ -4016,7 +4003,7 @@
         </p:nvSpPr>
         <p:spPr>
           <a:xfrm>
-            <a:off x="2381005" y="5985223"/>
+            <a:off x="2381005" y="5928495"/>
             <a:ext cx="2045508" cy="626122"/>
           </a:xfrm>
           <a:prstGeom prst="roundRect">
@@ -4081,8 +4068,21 @@
                   <a:srgbClr val="666633"/>
                 </a:solidFill>
               </a:rPr>
-              <a:t>Examining structural generalizations</a:t>
-            </a:r>
+              <a:t>Creating the detailed </a:t>
+            </a:r>
+            <a:r>
+              <a:rPr lang="en-CA" sz="1406">
+                <a:solidFill>
+                  <a:srgbClr val="666633"/>
+                </a:solidFill>
+              </a:rPr>
+              <a:t>structural view</a:t>
+            </a:r>
+            <a:endParaRPr lang="en-CA" sz="1406" dirty="0">
+              <a:solidFill>
+                <a:srgbClr val="666633"/>
+              </a:solidFill>
+            </a:endParaRPr>
           </a:p>
           <a:p>
             <a:pPr algn="ctr"/>
@@ -4241,7 +4241,7 @@
         </p:nvSpPr>
         <p:spPr>
           <a:xfrm>
-            <a:off x="2651640" y="1982878"/>
+            <a:off x="2667636" y="1934860"/>
             <a:ext cx="1561487" cy="501772"/>
           </a:xfrm>
           <a:prstGeom prst="flowChartMultidocument">
@@ -4293,26 +4293,13 @@
           <a:p>
             <a:pPr algn="ctr"/>
             <a:r>
-              <a:rPr lang="en-CA" sz="1406" dirty="0" smtClean="0">
+              <a:rPr lang="en-CA" sz="1406" dirty="0">
                 <a:solidFill>
                   <a:srgbClr val="666633"/>
                 </a:solidFill>
               </a:rPr>
-              <a:t>AU</a:t>
-            </a:r>
-            <a:r>
-              <a:rPr lang="en-CA" sz="1406" dirty="0" smtClean="0">
-                <a:solidFill>
-                  <a:srgbClr val="666633"/>
-                </a:solidFill>
-              </a:rPr>
-              <a:t>ASTs </a:t>
-            </a:r>
-            <a:endParaRPr lang="en-CA" sz="1406" dirty="0">
-              <a:solidFill>
-                <a:srgbClr val="666633"/>
-              </a:solidFill>
-            </a:endParaRPr>
+              <a:t>AUASTs </a:t>
+            </a:r>
           </a:p>
         </p:txBody>
       </p:sp>
@@ -4324,7 +4311,7 @@
         </p:nvSpPr>
         <p:spPr>
           <a:xfrm rot="10800000">
-            <a:off x="4590131" y="1981635"/>
+            <a:off x="4568860" y="1958048"/>
             <a:ext cx="195605" cy="408221"/>
           </a:xfrm>
           <a:prstGeom prst="rightArrow">
@@ -4600,7 +4587,7 @@
         </p:nvSpPr>
         <p:spPr>
           <a:xfrm rot="5400000">
-            <a:off x="3206061" y="5271786"/>
+            <a:off x="3283382" y="5273745"/>
             <a:ext cx="295240" cy="475002"/>
           </a:xfrm>
           <a:prstGeom prst="rightArrow">

</xml_diff>